<commit_message>
Hands On Demos - Day 5.
</commit_message>
<xml_diff>
--- a/1. Core Java 8/Day 5/Slides/Handling Exceptions in Java/2. Handling Exceptions/handling-exceptions-slides.pptx
+++ b/1. Core Java 8/Day 5/Slides/Handling Exceptions in Java/2. Handling Exceptions/handling-exceptions-slides.pptx
@@ -6268,6 +6268,31 @@
               <a:rPr/>
             </a:fld>
             <a:endParaRPr/>
+          </a:p>
+        </p:txBody>
+      </p:sp>
+      <p:sp>
+        <p:nvSpPr>
+          <p:cNvPr id="8" name="Text Box 7"/>
+          <p:cNvSpPr txBox="1"/>
+          <p:nvPr/>
+        </p:nvSpPr>
+        <p:spPr>
+          <a:xfrm>
+            <a:off x="10210800" y="3810000"/>
+            <a:ext cx="309880" cy="368300"/>
+          </a:xfrm>
+          <a:prstGeom prst="rect">
+            <a:avLst/>
+          </a:prstGeom>
+          <a:noFill/>
+        </p:spPr>
+        <p:txBody>
+          <a:bodyPr wrap="none" rtlCol="0">
+            <a:spAutoFit/>
+          </a:bodyPr>
+          <a:p>
+            <a:endParaRPr lang="en-US"/>
           </a:p>
         </p:txBody>
       </p:sp>
@@ -9048,8 +9073,8 @@
         </p:nvSpPr>
         <p:spPr>
           <a:xfrm>
-            <a:off x="353059" y="2659379"/>
-            <a:ext cx="4140200" cy="863600"/>
+            <a:off x="353060" y="2659380"/>
+            <a:ext cx="6276975" cy="858520"/>
           </a:xfrm>
           <a:prstGeom prst="rect">
             <a:avLst/>
@@ -9073,6 +9098,16 @@
               </a:tabLst>
             </a:pPr>
             <a:r>
+              <a:rPr lang="en-US" sz="2000" spc="-5" dirty="0">
+                <a:solidFill>
+                  <a:srgbClr val="F2F2F2"/>
+                </a:solidFill>
+                <a:latin typeface="Courier New" panose="02070309020205020404"/>
+                <a:cs typeface="Courier New" panose="02070309020205020404"/>
+              </a:rPr>
+              <a:t>    </a:t>
+            </a:r>
+            <a:r>
               <a:rPr sz="2000" spc="-5" dirty="0">
                 <a:solidFill>
                   <a:srgbClr val="F2F2F2"/>
@@ -9146,6 +9181,16 @@
                 <a:spcPts val="1800"/>
               </a:spcBef>
             </a:pPr>
+            <a:r>
+              <a:rPr lang="en-US" sz="2000" spc="-5" dirty="0">
+                <a:solidFill>
+                  <a:srgbClr val="F2F2F2"/>
+                </a:solidFill>
+                <a:latin typeface="Courier New" panose="02070309020205020404"/>
+                <a:cs typeface="Courier New" panose="02070309020205020404"/>
+              </a:rPr>
+              <a:t>    </a:t>
+            </a:r>
             <a:r>
               <a:rPr sz="2000" spc="-5" dirty="0">
                 <a:solidFill>

</xml_diff>